<commit_message>
move build process to index
- review glossary in both text and picture
- hide useless toc similar to SDK chapter pages
</commit_message>
<xml_diff>
--- a/VEEPortingGuide/images/process-overview5.pptx
+++ b/VEEPortingGuide/images/process-overview5.pptx
@@ -261,7 +261,7 @@
           <a:p>
             <a:fld id="{8382ADF2-3FF2-4FB4-8A07-AE359359CF4F}" type="datetimeFigureOut">
               <a:rPr lang="en-GB" smtClean="0"/>
-              <a:t>02/06/2020</a:t>
+              <a:t>25/03/2024</a:t>
             </a:fld>
             <a:endParaRPr lang="en-GB"/>
           </a:p>
@@ -461,7 +461,7 @@
           <a:p>
             <a:fld id="{8382ADF2-3FF2-4FB4-8A07-AE359359CF4F}" type="datetimeFigureOut">
               <a:rPr lang="en-GB" smtClean="0"/>
-              <a:t>02/06/2020</a:t>
+              <a:t>25/03/2024</a:t>
             </a:fld>
             <a:endParaRPr lang="en-GB"/>
           </a:p>
@@ -671,7 +671,7 @@
           <a:p>
             <a:fld id="{8382ADF2-3FF2-4FB4-8A07-AE359359CF4F}" type="datetimeFigureOut">
               <a:rPr lang="en-GB" smtClean="0"/>
-              <a:t>02/06/2020</a:t>
+              <a:t>25/03/2024</a:t>
             </a:fld>
             <a:endParaRPr lang="en-GB"/>
           </a:p>
@@ -871,7 +871,7 @@
           <a:p>
             <a:fld id="{8382ADF2-3FF2-4FB4-8A07-AE359359CF4F}" type="datetimeFigureOut">
               <a:rPr lang="en-GB" smtClean="0"/>
-              <a:t>02/06/2020</a:t>
+              <a:t>25/03/2024</a:t>
             </a:fld>
             <a:endParaRPr lang="en-GB"/>
           </a:p>
@@ -1147,7 +1147,7 @@
           <a:p>
             <a:fld id="{8382ADF2-3FF2-4FB4-8A07-AE359359CF4F}" type="datetimeFigureOut">
               <a:rPr lang="en-GB" smtClean="0"/>
-              <a:t>02/06/2020</a:t>
+              <a:t>25/03/2024</a:t>
             </a:fld>
             <a:endParaRPr lang="en-GB"/>
           </a:p>
@@ -1415,7 +1415,7 @@
           <a:p>
             <a:fld id="{8382ADF2-3FF2-4FB4-8A07-AE359359CF4F}" type="datetimeFigureOut">
               <a:rPr lang="en-GB" smtClean="0"/>
-              <a:t>02/06/2020</a:t>
+              <a:t>25/03/2024</a:t>
             </a:fld>
             <a:endParaRPr lang="en-GB"/>
           </a:p>
@@ -1830,7 +1830,7 @@
           <a:p>
             <a:fld id="{8382ADF2-3FF2-4FB4-8A07-AE359359CF4F}" type="datetimeFigureOut">
               <a:rPr lang="en-GB" smtClean="0"/>
-              <a:t>02/06/2020</a:t>
+              <a:t>25/03/2024</a:t>
             </a:fld>
             <a:endParaRPr lang="en-GB"/>
           </a:p>
@@ -1972,7 +1972,7 @@
           <a:p>
             <a:fld id="{8382ADF2-3FF2-4FB4-8A07-AE359359CF4F}" type="datetimeFigureOut">
               <a:rPr lang="en-GB" smtClean="0"/>
-              <a:t>02/06/2020</a:t>
+              <a:t>25/03/2024</a:t>
             </a:fld>
             <a:endParaRPr lang="en-GB"/>
           </a:p>
@@ -2085,7 +2085,7 @@
           <a:p>
             <a:fld id="{8382ADF2-3FF2-4FB4-8A07-AE359359CF4F}" type="datetimeFigureOut">
               <a:rPr lang="en-GB" smtClean="0"/>
-              <a:t>02/06/2020</a:t>
+              <a:t>25/03/2024</a:t>
             </a:fld>
             <a:endParaRPr lang="en-GB"/>
           </a:p>
@@ -2398,7 +2398,7 @@
           <a:p>
             <a:fld id="{8382ADF2-3FF2-4FB4-8A07-AE359359CF4F}" type="datetimeFigureOut">
               <a:rPr lang="en-GB" smtClean="0"/>
-              <a:t>02/06/2020</a:t>
+              <a:t>25/03/2024</a:t>
             </a:fld>
             <a:endParaRPr lang="en-GB"/>
           </a:p>
@@ -2687,7 +2687,7 @@
           <a:p>
             <a:fld id="{8382ADF2-3FF2-4FB4-8A07-AE359359CF4F}" type="datetimeFigureOut">
               <a:rPr lang="en-GB" smtClean="0"/>
-              <a:t>02/06/2020</a:t>
+              <a:t>25/03/2024</a:t>
             </a:fld>
             <a:endParaRPr lang="en-GB"/>
           </a:p>
@@ -2930,7 +2930,7 @@
           <a:p>
             <a:fld id="{8382ADF2-3FF2-4FB4-8A07-AE359359CF4F}" type="datetimeFigureOut">
               <a:rPr lang="en-GB" smtClean="0"/>
-              <a:t>02/06/2020</a:t>
+              <a:t>25/03/2024</a:t>
             </a:fld>
             <a:endParaRPr lang="en-GB"/>
           </a:p>
@@ -3436,44 +3436,6 @@
               <a:defRPr/>
             </a:pPr>
             <a:r>
-              <a:rPr lang="en-US" sz="1200" b="1" kern="0" dirty="0" err="1">
-                <a:solidFill>
-                  <a:srgbClr val="FFFFFF"/>
-                </a:solidFill>
-                <a:latin typeface="Source Sans Pro Light" charset="0"/>
-                <a:ea typeface="Source Sans Pro Light" charset="0"/>
-                <a:cs typeface="Source Sans Pro Light" charset="0"/>
-              </a:rPr>
-              <a:t>MicroEJ</a:t>
-            </a:r>
-            <a:endParaRPr lang="en-US" sz="1200" b="1" kern="0" dirty="0">
-              <a:solidFill>
-                <a:srgbClr val="FFFFFF"/>
-              </a:solidFill>
-              <a:latin typeface="Source Sans Pro Light" charset="0"/>
-              <a:ea typeface="Source Sans Pro Light" charset="0"/>
-              <a:cs typeface="Source Sans Pro Light" charset="0"/>
-            </a:endParaRPr>
-          </a:p>
-          <a:p>
-            <a:pPr marL="0" marR="0" lvl="0" indent="0" algn="ctr" defTabSz="914377" eaLnBrk="1" fontAlgn="auto" latinLnBrk="0" hangingPunct="1">
-              <a:lnSpc>
-                <a:spcPct val="100000"/>
-              </a:lnSpc>
-              <a:spcBef>
-                <a:spcPts val="0"/>
-              </a:spcBef>
-              <a:spcAft>
-                <a:spcPts val="0"/>
-              </a:spcAft>
-              <a:buClrTx/>
-              <a:buSzTx/>
-              <a:buFontTx/>
-              <a:buNone/>
-              <a:tabLst/>
-              <a:defRPr/>
-            </a:pPr>
-            <a:r>
               <a:rPr kumimoji="0" lang="en-US" sz="1200" b="1" u="none" strike="noStrike" kern="0" cap="none" spc="0" normalizeH="0" baseline="0" noProof="0" dirty="0">
                 <a:ln>
                   <a:noFill/>
@@ -3550,17 +3512,6 @@
               <a:defRPr/>
             </a:pPr>
             <a:r>
-              <a:rPr lang="en-US" sz="1200" b="1" kern="0" dirty="0" err="1">
-                <a:solidFill>
-                  <a:srgbClr val="FFFFFF"/>
-                </a:solidFill>
-                <a:latin typeface="Source Sans Pro Light" charset="0"/>
-                <a:ea typeface="Source Sans Pro Light" charset="0"/>
-                <a:cs typeface="Source Sans Pro Light" charset="0"/>
-              </a:rPr>
-              <a:t>MicroEJ</a:t>
-            </a:r>
-            <a:r>
               <a:rPr lang="en-US" sz="1200" b="1" kern="0" dirty="0">
                 <a:solidFill>
                   <a:srgbClr val="FFFFFF"/>
@@ -3569,7 +3520,7 @@
                 <a:ea typeface="Source Sans Pro Light" charset="0"/>
                 <a:cs typeface="Source Sans Pro Light" charset="0"/>
               </a:rPr>
-              <a:t> Platform</a:t>
+              <a:t>VEE Port</a:t>
             </a:r>
           </a:p>
           <a:p>
@@ -3605,7 +3556,7 @@
                 <a:ea typeface="Source Sans Pro Light" charset="0"/>
                 <a:cs typeface="Source Sans Pro Light" charset="0"/>
               </a:rPr>
-              <a:t>Configuration</a:t>
+              <a:t>configuration</a:t>
             </a:r>
           </a:p>
           <a:p>
@@ -3711,17 +3662,6 @@
               <a:defRPr/>
             </a:pPr>
             <a:r>
-              <a:rPr lang="en-US" sz="1200" b="1" kern="0" dirty="0" err="1">
-                <a:solidFill>
-                  <a:srgbClr val="FFFFFF"/>
-                </a:solidFill>
-                <a:latin typeface="Source Sans Pro Light" charset="0"/>
-                <a:ea typeface="Source Sans Pro Light" charset="0"/>
-                <a:cs typeface="Source Sans Pro Light" charset="0"/>
-              </a:rPr>
-              <a:t>MicroEJ</a:t>
-            </a:r>
-            <a:r>
               <a:rPr lang="en-US" sz="1200" b="1" kern="0" dirty="0">
                 <a:solidFill>
                   <a:srgbClr val="FFFFFF"/>
@@ -3730,7 +3670,7 @@
                 <a:ea typeface="Source Sans Pro Light" charset="0"/>
                 <a:cs typeface="Source Sans Pro Light" charset="0"/>
               </a:rPr>
-              <a:t> Platform</a:t>
+              <a:t>VEE Port</a:t>
             </a:r>
           </a:p>
         </p:txBody>
@@ -3800,7 +3740,7 @@
                 <a:ea typeface="Source Sans Pro Light" charset="0"/>
                 <a:cs typeface="Source Sans Pro Light" charset="0"/>
               </a:rPr>
-              <a:t>Application library file</a:t>
+              <a:t>Application object file</a:t>
             </a:r>
           </a:p>
           <a:p>
@@ -4016,17 +3956,6 @@
               <a:defRPr/>
             </a:pPr>
             <a:r>
-              <a:rPr lang="en-US" sz="1200" b="1" kern="0" dirty="0" err="1">
-                <a:solidFill>
-                  <a:srgbClr val="FFFFFF"/>
-                </a:solidFill>
-                <a:latin typeface="Source Sans Pro Light" charset="0"/>
-                <a:ea typeface="Source Sans Pro Light" charset="0"/>
-                <a:cs typeface="Source Sans Pro Light" charset="0"/>
-              </a:rPr>
-              <a:t>MicroEJ</a:t>
-            </a:r>
-            <a:r>
               <a:rPr lang="en-US" sz="1200" b="1" kern="0" dirty="0">
                 <a:solidFill>
                   <a:srgbClr val="FFFFFF"/>
@@ -4035,7 +3964,7 @@
                 <a:ea typeface="Source Sans Pro Light" charset="0"/>
                 <a:cs typeface="Source Sans Pro Light" charset="0"/>
               </a:rPr>
-              <a:t> Application code</a:t>
+              <a:t>Application code</a:t>
             </a:r>
             <a:endParaRPr kumimoji="0" lang="en-US" sz="1200" b="1" u="none" strike="noStrike" kern="0" cap="none" spc="0" normalizeH="0" baseline="0" noProof="0" dirty="0">
               <a:ln>
@@ -4285,7 +4214,7 @@
           </a:bodyPr>
           <a:lstStyle/>
           <a:p>
-            <a:pPr marL="0" marR="0" lvl="0" indent="0" algn="ctr" defTabSz="914377" eaLnBrk="1" fontAlgn="auto" latinLnBrk="0" hangingPunct="1">
+            <a:pPr marR="0" lvl="0" algn="ctr" defTabSz="914377" eaLnBrk="1" fontAlgn="auto" latinLnBrk="0" hangingPunct="1">
               <a:lnSpc>
                 <a:spcPct val="100000"/>
               </a:lnSpc>
@@ -4297,8 +4226,6 @@
               </a:spcAft>
               <a:buClrTx/>
               <a:buSzTx/>
-              <a:buFontTx/>
-              <a:buNone/>
               <a:tabLst/>
               <a:defRPr/>
             </a:pPr>
@@ -4319,8 +4246,25 @@
               </a:rPr>
               <a:t>1. Create a new </a:t>
             </a:r>
-            <a:r>
-              <a:rPr kumimoji="0" lang="en-US" sz="1100" b="0" u="none" strike="noStrike" kern="0" cap="none" spc="0" normalizeH="0" baseline="0" noProof="0" dirty="0" err="1">
+          </a:p>
+          <a:p>
+            <a:pPr marR="0" lvl="0" algn="ctr" defTabSz="914377" eaLnBrk="1" fontAlgn="auto" latinLnBrk="0" hangingPunct="1">
+              <a:lnSpc>
+                <a:spcPct val="100000"/>
+              </a:lnSpc>
+              <a:spcBef>
+                <a:spcPts val="0"/>
+              </a:spcBef>
+              <a:spcAft>
+                <a:spcPts val="0"/>
+              </a:spcAft>
+              <a:buClrTx/>
+              <a:buSzTx/>
+              <a:tabLst/>
+              <a:defRPr/>
+            </a:pPr>
+            <a:r>
+              <a:rPr kumimoji="0" lang="en-US" sz="1100" b="0" u="none" strike="noStrike" kern="0" cap="none" spc="0" normalizeH="0" baseline="0" noProof="0" dirty="0">
                 <a:ln>
                   <a:noFill/>
                 </a:ln>
@@ -4334,25 +4278,25 @@
                 <a:ea typeface="Source Sans Pro Light" charset="0"/>
                 <a:cs typeface="Source Sans Pro Light" charset="0"/>
               </a:rPr>
-              <a:t>MicroEJ</a:t>
-            </a:r>
-            <a:r>
-              <a:rPr kumimoji="0" lang="en-US" sz="1100" b="0" u="none" strike="noStrike" kern="0" cap="none" spc="0" normalizeH="0" baseline="0" noProof="0">
-                <a:ln>
-                  <a:noFill/>
-                </a:ln>
-                <a:solidFill>
-                  <a:srgbClr val="4B5357"/>
-                </a:solidFill>
-                <a:effectLst/>
-                <a:uLnTx/>
-                <a:uFillTx/>
-                <a:latin typeface="Source Sans Pro Light" charset="0"/>
-                <a:ea typeface="Source Sans Pro Light" charset="0"/>
-                <a:cs typeface="Source Sans Pro Light" charset="0"/>
-              </a:rPr>
-              <a:t> Platform </a:t>
-            </a:r>
+              <a:t>VEE Port</a:t>
+            </a:r>
+          </a:p>
+          <a:p>
+            <a:pPr marR="0" lvl="0" algn="ctr" defTabSz="914377" eaLnBrk="1" fontAlgn="auto" latinLnBrk="0" hangingPunct="1">
+              <a:lnSpc>
+                <a:spcPct val="100000"/>
+              </a:lnSpc>
+              <a:spcBef>
+                <a:spcPts val="0"/>
+              </a:spcBef>
+              <a:spcAft>
+                <a:spcPts val="0"/>
+              </a:spcAft>
+              <a:buClrTx/>
+              <a:buSzTx/>
+              <a:tabLst/>
+              <a:defRPr/>
+            </a:pPr>
             <a:r>
               <a:rPr kumimoji="0" lang="en-US" sz="1100" b="0" u="none" strike="noStrike" kern="0" cap="none" spc="0" normalizeH="0" baseline="0" noProof="0" dirty="0">
                 <a:ln>
@@ -4524,41 +4468,7 @@
                 <a:ea typeface="Source Sans Pro Light" charset="0"/>
                 <a:cs typeface="Source Sans Pro Light" charset="0"/>
               </a:rPr>
-              <a:t>3. Build the </a:t>
-            </a:r>
-            <a:r>
-              <a:rPr kumimoji="0" lang="en-US" sz="1100" b="0" u="none" strike="noStrike" kern="0" cap="none" spc="0" normalizeH="0" baseline="0" noProof="0" dirty="0" err="1">
-                <a:ln>
-                  <a:noFill/>
-                </a:ln>
-                <a:solidFill>
-                  <a:srgbClr val="4B5357"/>
-                </a:solidFill>
-                <a:effectLst/>
-                <a:uLnTx/>
-                <a:uFillTx/>
-                <a:latin typeface="Source Sans Pro Light" charset="0"/>
-                <a:ea typeface="Source Sans Pro Light" charset="0"/>
-                <a:cs typeface="Source Sans Pro Light" charset="0"/>
-              </a:rPr>
-              <a:t>MicroEJ</a:t>
-            </a:r>
-            <a:r>
-              <a:rPr kumimoji="0" lang="en-US" sz="1100" b="0" u="none" strike="noStrike" kern="0" cap="none" spc="0" normalizeH="0" baseline="0" noProof="0" dirty="0">
-                <a:ln>
-                  <a:noFill/>
-                </a:ln>
-                <a:solidFill>
-                  <a:srgbClr val="4B5357"/>
-                </a:solidFill>
-                <a:effectLst/>
-                <a:uLnTx/>
-                <a:uFillTx/>
-                <a:latin typeface="Source Sans Pro Light" charset="0"/>
-                <a:ea typeface="Source Sans Pro Light" charset="0"/>
-                <a:cs typeface="Source Sans Pro Light" charset="0"/>
-              </a:rPr>
-              <a:t> Platform</a:t>
+              <a:t>3. Build the VEE Port</a:t>
             </a:r>
           </a:p>
         </p:txBody>
@@ -4636,41 +4546,7 @@
                 <a:ea typeface="Source Sans Pro Light" charset="0"/>
                 <a:cs typeface="Source Sans Pro Light" charset="0"/>
               </a:rPr>
-              <a:t>4. Build the </a:t>
-            </a:r>
-            <a:r>
-              <a:rPr kumimoji="0" lang="en-US" sz="1100" b="0" u="none" strike="noStrike" kern="0" cap="none" spc="0" normalizeH="0" baseline="0" noProof="0" dirty="0" err="1">
-                <a:ln>
-                  <a:noFill/>
-                </a:ln>
-                <a:solidFill>
-                  <a:srgbClr val="4B5357"/>
-                </a:solidFill>
-                <a:effectLst/>
-                <a:uLnTx/>
-                <a:uFillTx/>
-                <a:latin typeface="Source Sans Pro Light" charset="0"/>
-                <a:ea typeface="Source Sans Pro Light" charset="0"/>
-                <a:cs typeface="Source Sans Pro Light" charset="0"/>
-              </a:rPr>
-              <a:t>MicroEJ</a:t>
-            </a:r>
-            <a:r>
-              <a:rPr kumimoji="0" lang="en-US" sz="1100" b="0" u="none" strike="noStrike" kern="0" cap="none" spc="0" normalizeH="0" baseline="0" noProof="0" dirty="0">
-                <a:ln>
-                  <a:noFill/>
-                </a:ln>
-                <a:solidFill>
-                  <a:srgbClr val="4B5357"/>
-                </a:solidFill>
-                <a:effectLst/>
-                <a:uLnTx/>
-                <a:uFillTx/>
-                <a:latin typeface="Source Sans Pro Light" charset="0"/>
-                <a:ea typeface="Source Sans Pro Light" charset="0"/>
-                <a:cs typeface="Source Sans Pro Light" charset="0"/>
-              </a:rPr>
-              <a:t> Application</a:t>
+              <a:t>4. Build the Application</a:t>
             </a:r>
           </a:p>
         </p:txBody>
@@ -4826,7 +4702,7 @@
                 <a:ea typeface="Source Sans Pro Light" charset="0"/>
                 <a:cs typeface="Source Sans Pro Light" charset="0"/>
               </a:rPr>
-              <a:t>6. Program and test the application on the board</a:t>
+              <a:t>6. Program and test the application on the device</a:t>
             </a:r>
           </a:p>
         </p:txBody>
@@ -5408,23 +5284,6 @@
               <a:defRPr/>
             </a:pPr>
             <a:r>
-              <a:rPr kumimoji="0" lang="en-US" sz="1200" b="0" i="0" u="none" strike="noStrike" kern="0" cap="none" spc="0" normalizeH="0" baseline="0" noProof="0" dirty="0" err="1">
-                <a:ln>
-                  <a:noFill/>
-                </a:ln>
-                <a:solidFill>
-                  <a:srgbClr val="4B5357"/>
-                </a:solidFill>
-                <a:effectLst/>
-                <a:uLnTx/>
-                <a:uFillTx/>
-                <a:latin typeface="Source Sans Pro Light" charset="0"/>
-                <a:ea typeface="Source Sans Pro Light" charset="0"/>
-                <a:cs typeface="Source Sans Pro Light" charset="0"/>
-              </a:rPr>
-              <a:t>MicroEJ</a:t>
-            </a:r>
-            <a:r>
               <a:rPr kumimoji="0" lang="en-US" sz="1200" b="0" i="0" u="none" strike="noStrike" kern="0" cap="none" spc="0" normalizeH="0" baseline="0" noProof="0" dirty="0">
                 <a:ln>
                   <a:noFill/>
@@ -5439,7 +5298,7 @@
                 <a:ea typeface="Source Sans Pro Light" charset="0"/>
                 <a:cs typeface="Source Sans Pro Light" charset="0"/>
               </a:rPr>
-              <a:t> Workbench</a:t>
+              <a:t>MICROEJ SDK</a:t>
             </a:r>
           </a:p>
         </p:txBody>

</xml_diff>